<commit_message>
Final Document and Presentation Done
</commit_message>
<xml_diff>
--- a/Dominion Final Presentation.pptx
+++ b/Dominion Final Presentation.pptx
@@ -116,6 +116,11 @@
       </a:defRPr>
     </a:lvl9pPr>
   </p:defaultTextStyle>
+  <p:extLst>
+    <p:ext uri="{EFAFB233-063F-42B5-8137-9DF3F51BA10A}">
+      <p15:sldGuideLst xmlns:p15="http://schemas.microsoft.com/office/powerpoint/2012/main"/>
+    </p:ext>
+  </p:extLst>
 </p:presentation>
 </file>
 
@@ -3520,15 +3525,92 @@
             <p:ph idx="1"/>
           </p:nvPr>
         </p:nvSpPr>
-        <p:spPr/>
-        <p:txBody>
-          <a:bodyPr/>
-          <a:lstStyle/>
-          <a:p>
-            <a:endParaRPr lang="en-US" dirty="0"/>
-          </a:p>
-        </p:txBody>
-      </p:sp>
+        <p:spPr>
+          <a:xfrm>
+            <a:off x="838200" y="1825625"/>
+            <a:ext cx="4403271" cy="2436132"/>
+          </a:xfrm>
+        </p:spPr>
+        <p:txBody>
+          <a:bodyPr>
+            <a:normAutofit/>
+          </a:bodyPr>
+          <a:lstStyle/>
+          <a:p>
+            <a:pPr>
+              <a:lnSpc>
+                <a:spcPct val="200000"/>
+              </a:lnSpc>
+            </a:pPr>
+            <a:r>
+              <a:rPr lang="en-US" sz="2400" dirty="0" smtClean="0">
+                <a:latin typeface="Times New Roman" panose="02020603050405020304" pitchFamily="18" charset="0"/>
+                <a:cs typeface="Times New Roman" panose="02020603050405020304" pitchFamily="18" charset="0"/>
+              </a:rPr>
+              <a:t>Code Coverage: 90.77%</a:t>
+            </a:r>
+          </a:p>
+          <a:p>
+            <a:pPr>
+              <a:lnSpc>
+                <a:spcPct val="200000"/>
+              </a:lnSpc>
+            </a:pPr>
+            <a:r>
+              <a:rPr lang="en-US" sz="2400" dirty="0" smtClean="0">
+                <a:latin typeface="Times New Roman" panose="02020603050405020304" pitchFamily="18" charset="0"/>
+                <a:cs typeface="Times New Roman" panose="02020603050405020304" pitchFamily="18" charset="0"/>
+              </a:rPr>
+              <a:t>Maintainability Index: 72</a:t>
+            </a:r>
+            <a:endParaRPr lang="en-US" sz="2400" dirty="0">
+              <a:latin typeface="Times New Roman" panose="02020603050405020304" pitchFamily="18" charset="0"/>
+              <a:cs typeface="Times New Roman" panose="02020603050405020304" pitchFamily="18" charset="0"/>
+            </a:endParaRPr>
+          </a:p>
+        </p:txBody>
+      </p:sp>
+      <p:pic>
+        <p:nvPicPr>
+          <p:cNvPr id="1026" name="Picture 2" descr="http://blogs.microsoft.co.il/blogs/shair/image_thumb_3D8F9C79.png"/>
+          <p:cNvPicPr>
+            <a:picLocks noChangeAspect="1" noChangeArrowheads="1"/>
+          </p:cNvPicPr>
+          <p:nvPr/>
+        </p:nvPicPr>
+        <p:blipFill>
+          <a:blip r:embed="rId2">
+            <a:extLst>
+              <a:ext uri="{28A0092B-C50C-407E-A947-70E740481C1C}">
+                <a14:useLocalDpi xmlns:a14="http://schemas.microsoft.com/office/drawing/2010/main" val="0"/>
+              </a:ext>
+            </a:extLst>
+          </a:blip>
+          <a:srcRect/>
+          <a:stretch>
+            <a:fillRect/>
+          </a:stretch>
+        </p:blipFill>
+        <p:spPr bwMode="auto">
+          <a:xfrm>
+            <a:off x="4931711" y="2967604"/>
+            <a:ext cx="6984518" cy="2588305"/>
+          </a:xfrm>
+          <a:prstGeom prst="rect">
+            <a:avLst/>
+          </a:prstGeom>
+          <a:noFill/>
+          <a:extLst>
+            <a:ext uri="{909E8E84-426E-40DD-AFC4-6F175D3DCCD1}">
+              <a14:hiddenFill xmlns:a14="http://schemas.microsoft.com/office/drawing/2010/main">
+                <a:solidFill>
+                  <a:srgbClr val="FFFFFF"/>
+                </a:solidFill>
+              </a14:hiddenFill>
+            </a:ext>
+          </a:extLst>
+        </p:spPr>
+      </p:pic>
     </p:spTree>
     <p:extLst>
       <p:ext uri="{BB962C8B-B14F-4D97-AF65-F5344CB8AC3E}">

</xml_diff>